<commit_message>
Ajout de sprites et Presentation à jour
</commit_message>
<xml_diff>
--- a/Presentation/Présentation_ValentinZeller.pptx
+++ b/Presentation/Présentation_ValentinZeller.pptx
@@ -9,9 +9,11 @@
     <p:sldId id="258" r:id="rId3"/>
     <p:sldId id="259" r:id="rId4"/>
     <p:sldId id="260" r:id="rId5"/>
-    <p:sldId id="261" r:id="rId6"/>
-    <p:sldId id="257" r:id="rId7"/>
-    <p:sldId id="262" r:id="rId8"/>
+    <p:sldId id="264" r:id="rId6"/>
+    <p:sldId id="261" r:id="rId7"/>
+    <p:sldId id="263" r:id="rId8"/>
+    <p:sldId id="257" r:id="rId9"/>
+    <p:sldId id="262" r:id="rId10"/>
   </p:sldIdLst>
   <p:sldSz cx="12192000" cy="6858000"/>
   <p:notesSz cx="6858000" cy="9144000"/>
@@ -3796,54 +3798,12 @@
           <a:chExt cx="0" cy="0"/>
         </a:xfrm>
       </p:grpSpPr>
-      <p:sp>
-        <p:nvSpPr>
-          <p:cNvPr id="7" name="Titre 1">
-            <a:extLst>
-              <a:ext uri="{FF2B5EF4-FFF2-40B4-BE49-F238E27FC236}">
-                <a16:creationId xmlns:a16="http://schemas.microsoft.com/office/drawing/2014/main" id="{F7EF8E5C-5C0E-4B61-83E6-807DCD8A2CC8}"/>
-              </a:ext>
-            </a:extLst>
-          </p:cNvPr>
-          <p:cNvSpPr>
-            <a:spLocks noGrp="1"/>
-          </p:cNvSpPr>
-          <p:nvPr>
-            <p:ph type="title"/>
-          </p:nvPr>
-        </p:nvSpPr>
-        <p:spPr>
-          <a:xfrm>
-            <a:off x="391006" y="1904"/>
-            <a:ext cx="5127031" cy="1676603"/>
-          </a:xfrm>
-        </p:spPr>
-        <p:txBody>
-          <a:bodyPr>
-            <a:normAutofit/>
-          </a:bodyPr>
-          <a:lstStyle/>
-          <a:p>
-            <a:r>
-              <a:rPr lang="fr-FR" dirty="0">
-                <a:solidFill>
-                  <a:schemeClr val="bg1">
-                    <a:lumMod val="95000"/>
-                  </a:schemeClr>
-                </a:solidFill>
-                <a:latin typeface="Bahnschrift SemiBold SemiConden" panose="020B0502040204020203" pitchFamily="34" charset="0"/>
-              </a:rPr>
-              <a:t>Principe</a:t>
-            </a:r>
-          </a:p>
-        </p:txBody>
-      </p:sp>
       <p:pic>
         <p:nvPicPr>
-          <p:cNvPr id="8" name="Image 7">
+          <p:cNvPr id="27" name="Image 26">
             <a:extLst>
               <a:ext uri="{FF2B5EF4-FFF2-40B4-BE49-F238E27FC236}">
-                <a16:creationId xmlns:a16="http://schemas.microsoft.com/office/drawing/2014/main" id="{0AD2981A-7E89-4833-887B-DD4C6A62EAF2}"/>
+                <a16:creationId xmlns:a16="http://schemas.microsoft.com/office/drawing/2014/main" id="{B4F30782-85B6-4FC0-8D82-511A46E6BEE9}"/>
               </a:ext>
             </a:extLst>
           </p:cNvPr>
@@ -3860,44 +3820,56 @@
         </p:blipFill>
         <p:spPr>
           <a:xfrm>
-            <a:off x="391006" y="2941872"/>
-            <a:ext cx="5468306" cy="3075922"/>
+            <a:off x="6408826" y="2941872"/>
+            <a:ext cx="5468304" cy="3075921"/>
           </a:xfrm>
           <a:prstGeom prst="rect">
             <a:avLst/>
           </a:prstGeom>
         </p:spPr>
       </p:pic>
-      <p:pic>
-        <p:nvPicPr>
-          <p:cNvPr id="9" name="Image 8">
+      <p:sp>
+        <p:nvSpPr>
+          <p:cNvPr id="7" name="Titre 1">
             <a:extLst>
               <a:ext uri="{FF2B5EF4-FFF2-40B4-BE49-F238E27FC236}">
-                <a16:creationId xmlns:a16="http://schemas.microsoft.com/office/drawing/2014/main" id="{930B17D0-7BE9-4552-B966-0DE03BE3E0CA}"/>
+                <a16:creationId xmlns:a16="http://schemas.microsoft.com/office/drawing/2014/main" id="{F7EF8E5C-5C0E-4B61-83E6-807DCD8A2CC8}"/>
               </a:ext>
             </a:extLst>
           </p:cNvPr>
-          <p:cNvPicPr>
-            <a:picLocks noChangeAspect="1"/>
-          </p:cNvPicPr>
-          <p:nvPr/>
-        </p:nvPicPr>
-        <p:blipFill>
-          <a:blip r:embed="rId3"/>
-          <a:stretch>
-            <a:fillRect/>
-          </a:stretch>
-        </p:blipFill>
-        <p:spPr>
-          <a:xfrm>
-            <a:off x="6332689" y="2937353"/>
-            <a:ext cx="5476339" cy="3080441"/>
-          </a:xfrm>
-          <a:prstGeom prst="rect">
-            <a:avLst/>
-          </a:prstGeom>
-        </p:spPr>
-      </p:pic>
+          <p:cNvSpPr>
+            <a:spLocks noGrp="1"/>
+          </p:cNvSpPr>
+          <p:nvPr>
+            <p:ph type="title"/>
+          </p:nvPr>
+        </p:nvSpPr>
+        <p:spPr>
+          <a:xfrm>
+            <a:off x="391006" y="1904"/>
+            <a:ext cx="5127031" cy="1676603"/>
+          </a:xfrm>
+        </p:spPr>
+        <p:txBody>
+          <a:bodyPr>
+            <a:normAutofit/>
+          </a:bodyPr>
+          <a:lstStyle/>
+          <a:p>
+            <a:r>
+              <a:rPr lang="fr-FR" dirty="0">
+                <a:solidFill>
+                  <a:schemeClr val="bg1">
+                    <a:lumMod val="95000"/>
+                  </a:schemeClr>
+                </a:solidFill>
+                <a:latin typeface="Bahnschrift SemiBold SemiConden" panose="020B0502040204020203" pitchFamily="34" charset="0"/>
+              </a:rPr>
+              <a:t>Principe</a:t>
+            </a:r>
+          </a:p>
+        </p:txBody>
+      </p:sp>
       <p:sp>
         <p:nvSpPr>
           <p:cNvPr id="11" name="Rectangle 10">
@@ -3940,12 +3912,52 @@
           </a:p>
         </p:txBody>
       </p:sp>
+      <p:sp>
+        <p:nvSpPr>
+          <p:cNvPr id="5" name="ZoneTexte 4">
+            <a:extLst>
+              <a:ext uri="{FF2B5EF4-FFF2-40B4-BE49-F238E27FC236}">
+                <a16:creationId xmlns:a16="http://schemas.microsoft.com/office/drawing/2014/main" id="{53CEE680-6D92-4E74-B119-A233540C9BD1}"/>
+              </a:ext>
+            </a:extLst>
+          </p:cNvPr>
+          <p:cNvSpPr txBox="1"/>
+          <p:nvPr/>
+        </p:nvSpPr>
+        <p:spPr>
+          <a:xfrm>
+            <a:off x="6824885" y="1679134"/>
+            <a:ext cx="4378733" cy="461665"/>
+          </a:xfrm>
+          <a:prstGeom prst="rect">
+            <a:avLst/>
+          </a:prstGeom>
+          <a:noFill/>
+        </p:spPr>
+        <p:txBody>
+          <a:bodyPr wrap="square" rtlCol="0">
+            <a:spAutoFit/>
+          </a:bodyPr>
+          <a:lstStyle/>
+          <a:p>
+            <a:r>
+              <a:rPr lang="fr-FR" sz="2400" dirty="0">
+                <a:solidFill>
+                  <a:schemeClr val="bg1"/>
+                </a:solidFill>
+                <a:latin typeface="Bahnschrift Light Condensed" panose="020B0502040204020203" pitchFamily="34" charset="0"/>
+              </a:rPr>
+              <a:t>Déplacer les objets qui tombent dessus</a:t>
+            </a:r>
+          </a:p>
+        </p:txBody>
+      </p:sp>
       <p:cxnSp>
         <p:nvCxnSpPr>
-          <p:cNvPr id="3" name="Connecteur droit avec flèche 2">
+          <p:cNvPr id="10" name="Connecteur droit avec flèche 9">
             <a:extLst>
               <a:ext uri="{FF2B5EF4-FFF2-40B4-BE49-F238E27FC236}">
-                <a16:creationId xmlns:a16="http://schemas.microsoft.com/office/drawing/2014/main" id="{BF7423A7-FD95-4410-A1B9-EFE062D54EB6}"/>
+                <a16:creationId xmlns:a16="http://schemas.microsoft.com/office/drawing/2014/main" id="{2EBF4CDA-0082-451B-A84D-86352BFFF356}"/>
               </a:ext>
             </a:extLst>
           </p:cNvPr>
@@ -3955,9 +3967,9 @@
           <p:nvPr/>
         </p:nvCxnSpPr>
         <p:spPr>
-          <a:xfrm>
-            <a:off x="2663301" y="2148396"/>
-            <a:ext cx="291220" cy="2858610"/>
+          <a:xfrm flipH="1">
+            <a:off x="7457243" y="2206760"/>
+            <a:ext cx="985422" cy="2972106"/>
           </a:xfrm>
           <a:prstGeom prst="straightConnector1">
             <a:avLst/>
@@ -3984,65 +3996,54 @@
           </a:fontRef>
         </p:style>
       </p:cxnSp>
-      <p:sp>
-        <p:nvSpPr>
-          <p:cNvPr id="5" name="ZoneTexte 4">
+      <p:pic>
+        <p:nvPicPr>
+          <p:cNvPr id="26" name="Image 25">
             <a:extLst>
               <a:ext uri="{FF2B5EF4-FFF2-40B4-BE49-F238E27FC236}">
-                <a16:creationId xmlns:a16="http://schemas.microsoft.com/office/drawing/2014/main" id="{53CEE680-6D92-4E74-B119-A233540C9BD1}"/>
+                <a16:creationId xmlns:a16="http://schemas.microsoft.com/office/drawing/2014/main" id="{8CE50884-1C0A-42C1-9DDC-74153F6CC80E}"/>
               </a:ext>
             </a:extLst>
           </p:cNvPr>
-          <p:cNvSpPr txBox="1"/>
+          <p:cNvPicPr>
+            <a:picLocks noChangeAspect="1"/>
+          </p:cNvPicPr>
           <p:nvPr/>
-        </p:nvSpPr>
-        <p:spPr>
-          <a:xfrm>
-            <a:off x="6711518" y="1669603"/>
-            <a:ext cx="4749554" cy="461665"/>
+        </p:nvPicPr>
+        <p:blipFill>
+          <a:blip r:embed="rId3"/>
+          <a:stretch>
+            <a:fillRect/>
+          </a:stretch>
+        </p:blipFill>
+        <p:spPr>
+          <a:xfrm>
+            <a:off x="371554" y="2941872"/>
+            <a:ext cx="5468303" cy="3075921"/>
           </a:xfrm>
           <a:prstGeom prst="rect">
             <a:avLst/>
           </a:prstGeom>
-          <a:noFill/>
-        </p:spPr>
-        <p:txBody>
-          <a:bodyPr wrap="square" rtlCol="0">
-            <a:spAutoFit/>
-          </a:bodyPr>
-          <a:lstStyle/>
-          <a:p>
-            <a:r>
-              <a:rPr lang="fr-FR" sz="2400" dirty="0">
-                <a:solidFill>
-                  <a:schemeClr val="bg1"/>
-                </a:solidFill>
-                <a:latin typeface="Bahnschrift Light Condensed" panose="020B0502040204020203" pitchFamily="34" charset="0"/>
-              </a:rPr>
-              <a:t>Faites attention aux objets qui tombent</a:t>
-            </a:r>
-          </a:p>
-        </p:txBody>
-      </p:sp>
+        </p:spPr>
+      </p:pic>
       <p:cxnSp>
         <p:nvCxnSpPr>
-          <p:cNvPr id="10" name="Connecteur droit avec flèche 9">
+          <p:cNvPr id="3" name="Connecteur droit avec flèche 2">
             <a:extLst>
               <a:ext uri="{FF2B5EF4-FFF2-40B4-BE49-F238E27FC236}">
-                <a16:creationId xmlns:a16="http://schemas.microsoft.com/office/drawing/2014/main" id="{2EBF4CDA-0082-451B-A84D-86352BFFF356}"/>
+                <a16:creationId xmlns:a16="http://schemas.microsoft.com/office/drawing/2014/main" id="{BF7423A7-FD95-4410-A1B9-EFE062D54EB6}"/>
               </a:ext>
             </a:extLst>
           </p:cNvPr>
           <p:cNvCxnSpPr>
             <a:cxnSpLocks/>
-            <a:stCxn id="5" idx="2"/>
           </p:cNvCxnSpPr>
           <p:nvPr/>
         </p:nvCxnSpPr>
         <p:spPr>
           <a:xfrm>
-            <a:off x="9086295" y="2131268"/>
-            <a:ext cx="315157" cy="2236546"/>
+            <a:off x="2663301" y="2148396"/>
+            <a:ext cx="442405" cy="2956264"/>
           </a:xfrm>
           <a:prstGeom prst="straightConnector1">
             <a:avLst/>
@@ -4088,6 +4089,434 @@
     <p:bg>
       <p:bgPr>
         <a:solidFill>
+          <a:srgbClr val="6C659F"/>
+        </a:solidFill>
+        <a:effectLst/>
+      </p:bgPr>
+    </p:bg>
+    <p:spTree>
+      <p:nvGrpSpPr>
+        <p:cNvPr id="1" name=""/>
+        <p:cNvGrpSpPr/>
+        <p:nvPr/>
+      </p:nvGrpSpPr>
+      <p:grpSpPr>
+        <a:xfrm>
+          <a:off x="0" y="0"/>
+          <a:ext cx="0" cy="0"/>
+          <a:chOff x="0" y="0"/>
+          <a:chExt cx="0" cy="0"/>
+        </a:xfrm>
+      </p:grpSpPr>
+      <p:sp>
+        <p:nvSpPr>
+          <p:cNvPr id="4" name="Rectangle 3">
+            <a:extLst>
+              <a:ext uri="{FF2B5EF4-FFF2-40B4-BE49-F238E27FC236}">
+                <a16:creationId xmlns:a16="http://schemas.microsoft.com/office/drawing/2014/main" id="{3CE4980F-4B98-4CA7-BDB5-92C1FA0AD438}"/>
+              </a:ext>
+            </a:extLst>
+          </p:cNvPr>
+          <p:cNvSpPr/>
+          <p:nvPr/>
+        </p:nvSpPr>
+        <p:spPr>
+          <a:xfrm>
+            <a:off x="5803844" y="4086948"/>
+            <a:ext cx="514350" cy="2828924"/>
+          </a:xfrm>
+          <a:prstGeom prst="rect">
+            <a:avLst/>
+          </a:prstGeom>
+          <a:solidFill>
+            <a:schemeClr val="bg2">
+              <a:lumMod val="75000"/>
+            </a:schemeClr>
+          </a:solidFill>
+          <a:ln>
+            <a:solidFill>
+              <a:schemeClr val="bg2">
+                <a:lumMod val="75000"/>
+              </a:schemeClr>
+            </a:solidFill>
+          </a:ln>
+          <a:effectLst>
+            <a:reflection stA="0" endPos="0" dist="50800" dir="5400000" sy="-100000" algn="bl" rotWithShape="0"/>
+          </a:effectLst>
+        </p:spPr>
+        <p:style>
+          <a:lnRef idx="2">
+            <a:schemeClr val="accent1">
+              <a:shade val="50000"/>
+            </a:schemeClr>
+          </a:lnRef>
+          <a:fillRef idx="1">
+            <a:schemeClr val="accent1"/>
+          </a:fillRef>
+          <a:effectRef idx="0">
+            <a:schemeClr val="accent1"/>
+          </a:effectRef>
+          <a:fontRef idx="minor">
+            <a:schemeClr val="lt1"/>
+          </a:fontRef>
+        </p:style>
+        <p:txBody>
+          <a:bodyPr rtlCol="0" anchor="ctr"/>
+          <a:lstStyle/>
+          <a:p>
+            <a:pPr algn="ctr"/>
+            <a:endParaRPr lang="fr-FR"/>
+          </a:p>
+        </p:txBody>
+      </p:sp>
+      <p:sp>
+        <p:nvSpPr>
+          <p:cNvPr id="5" name="Rectangle 4">
+            <a:extLst>
+              <a:ext uri="{FF2B5EF4-FFF2-40B4-BE49-F238E27FC236}">
+                <a16:creationId xmlns:a16="http://schemas.microsoft.com/office/drawing/2014/main" id="{5174105C-5BCF-4AC8-85AA-602E264CB8D0}"/>
+              </a:ext>
+            </a:extLst>
+          </p:cNvPr>
+          <p:cNvSpPr/>
+          <p:nvPr/>
+        </p:nvSpPr>
+        <p:spPr>
+          <a:xfrm>
+            <a:off x="1709737" y="3753573"/>
+            <a:ext cx="8772525" cy="333375"/>
+          </a:xfrm>
+          <a:prstGeom prst="rect">
+            <a:avLst/>
+          </a:prstGeom>
+          <a:solidFill>
+            <a:schemeClr val="tx1">
+              <a:lumMod val="65000"/>
+              <a:lumOff val="35000"/>
+            </a:schemeClr>
+          </a:solidFill>
+          <a:ln>
+            <a:solidFill>
+              <a:schemeClr val="tx1">
+                <a:lumMod val="65000"/>
+                <a:lumOff val="35000"/>
+              </a:schemeClr>
+            </a:solidFill>
+          </a:ln>
+          <a:effectLst>
+            <a:reflection stA="0" endPos="0" dist="50800" dir="5400000" sy="-100000" algn="bl" rotWithShape="0"/>
+          </a:effectLst>
+        </p:spPr>
+        <p:style>
+          <a:lnRef idx="2">
+            <a:schemeClr val="accent1">
+              <a:shade val="50000"/>
+            </a:schemeClr>
+          </a:lnRef>
+          <a:fillRef idx="1">
+            <a:schemeClr val="accent1"/>
+          </a:fillRef>
+          <a:effectRef idx="0">
+            <a:schemeClr val="accent1"/>
+          </a:effectRef>
+          <a:fontRef idx="minor">
+            <a:schemeClr val="lt1"/>
+          </a:fontRef>
+        </p:style>
+        <p:txBody>
+          <a:bodyPr rtlCol="0" anchor="ctr"/>
+          <a:lstStyle/>
+          <a:p>
+            <a:pPr algn="ctr"/>
+            <a:endParaRPr lang="fr-FR"/>
+          </a:p>
+        </p:txBody>
+      </p:sp>
+      <p:pic>
+        <p:nvPicPr>
+          <p:cNvPr id="6" name="Image 5">
+            <a:extLst>
+              <a:ext uri="{FF2B5EF4-FFF2-40B4-BE49-F238E27FC236}">
+                <a16:creationId xmlns:a16="http://schemas.microsoft.com/office/drawing/2014/main" id="{51B6F48E-2BF0-4A06-BF94-A44A9C9D16EC}"/>
+              </a:ext>
+            </a:extLst>
+          </p:cNvPr>
+          <p:cNvPicPr>
+            <a:picLocks noChangeAspect="1"/>
+          </p:cNvPicPr>
+          <p:nvPr/>
+        </p:nvPicPr>
+        <p:blipFill>
+          <a:blip r:embed="rId2">
+            <a:extLst>
+              <a:ext uri="{28A0092B-C50C-407E-A947-70E740481C1C}">
+                <a14:useLocalDpi xmlns:a14="http://schemas.microsoft.com/office/drawing/2010/main" val="0"/>
+              </a:ext>
+            </a:extLst>
+          </a:blip>
+          <a:stretch>
+            <a:fillRect/>
+          </a:stretch>
+        </p:blipFill>
+        <p:spPr>
+          <a:xfrm>
+            <a:off x="5803844" y="3281655"/>
+            <a:ext cx="466737" cy="425737"/>
+          </a:xfrm>
+          <a:prstGeom prst="rect">
+            <a:avLst/>
+          </a:prstGeom>
+        </p:spPr>
+      </p:pic>
+      <p:pic>
+        <p:nvPicPr>
+          <p:cNvPr id="8" name="Graphique 7" descr="Curseur">
+            <a:extLst>
+              <a:ext uri="{FF2B5EF4-FFF2-40B4-BE49-F238E27FC236}">
+                <a16:creationId xmlns:a16="http://schemas.microsoft.com/office/drawing/2014/main" id="{FC14D56E-E630-4B76-A351-8252F724D869}"/>
+              </a:ext>
+            </a:extLst>
+          </p:cNvPr>
+          <p:cNvPicPr>
+            <a:picLocks noChangeAspect="1"/>
+          </p:cNvPicPr>
+          <p:nvPr/>
+        </p:nvPicPr>
+        <p:blipFill>
+          <a:blip r:embed="rId3">
+            <a:lum bright="70000" contrast="-70000"/>
+            <a:extLst>
+              <a:ext uri="{28A0092B-C50C-407E-A947-70E740481C1C}">
+                <a14:useLocalDpi xmlns:a14="http://schemas.microsoft.com/office/drawing/2010/main" val="0"/>
+              </a:ext>
+              <a:ext uri="{96DAC541-7B7A-43D3-8B79-37D633B846F1}">
+                <asvg:svgBlip xmlns:asvg="http://schemas.microsoft.com/office/drawing/2016/SVG/main" r:embed="rId4"/>
+              </a:ext>
+            </a:extLst>
+          </a:blip>
+          <a:stretch>
+            <a:fillRect/>
+          </a:stretch>
+        </p:blipFill>
+        <p:spPr>
+          <a:xfrm>
+            <a:off x="6037212" y="3211908"/>
+            <a:ext cx="565230" cy="565230"/>
+          </a:xfrm>
+          <a:prstGeom prst="rect">
+            <a:avLst/>
+          </a:prstGeom>
+        </p:spPr>
+      </p:pic>
+      <p:sp>
+        <p:nvSpPr>
+          <p:cNvPr id="9" name="Titre 1">
+            <a:extLst>
+              <a:ext uri="{FF2B5EF4-FFF2-40B4-BE49-F238E27FC236}">
+                <a16:creationId xmlns:a16="http://schemas.microsoft.com/office/drawing/2014/main" id="{6923F33F-A153-42D0-AE54-DAF0684D1CA7}"/>
+              </a:ext>
+            </a:extLst>
+          </p:cNvPr>
+          <p:cNvSpPr>
+            <a:spLocks noGrp="1"/>
+          </p:cNvSpPr>
+          <p:nvPr>
+            <p:ph type="title"/>
+          </p:nvPr>
+        </p:nvSpPr>
+        <p:spPr>
+          <a:xfrm>
+            <a:off x="391006" y="1904"/>
+            <a:ext cx="5127031" cy="1676603"/>
+          </a:xfrm>
+        </p:spPr>
+        <p:txBody>
+          <a:bodyPr>
+            <a:normAutofit/>
+          </a:bodyPr>
+          <a:lstStyle/>
+          <a:p>
+            <a:r>
+              <a:rPr lang="fr-FR" dirty="0">
+                <a:solidFill>
+                  <a:schemeClr val="bg1">
+                    <a:lumMod val="95000"/>
+                  </a:schemeClr>
+                </a:solidFill>
+                <a:latin typeface="Bahnschrift SemiBold SemiConden" panose="020B0502040204020203" pitchFamily="34" charset="0"/>
+              </a:rPr>
+              <a:t>Principe</a:t>
+            </a:r>
+          </a:p>
+        </p:txBody>
+      </p:sp>
+    </p:spTree>
+    <p:extLst>
+      <p:ext uri="{BB962C8B-B14F-4D97-AF65-F5344CB8AC3E}">
+        <p14:creationId xmlns:p14="http://schemas.microsoft.com/office/powerpoint/2010/main" val="1332387797"/>
+      </p:ext>
+    </p:extLst>
+  </p:cSld>
+  <p:clrMapOvr>
+    <a:masterClrMapping/>
+  </p:clrMapOvr>
+  <p:timing>
+    <p:tnLst>
+      <p:par>
+        <p:cTn id="1" dur="indefinite" restart="never" nodeType="tmRoot">
+          <p:childTnLst>
+            <p:seq concurrent="1" nextAc="seek">
+              <p:cTn id="2" dur="indefinite" nodeType="mainSeq">
+                <p:childTnLst>
+                  <p:par>
+                    <p:cTn id="3" fill="hold">
+                      <p:stCondLst>
+                        <p:cond delay="indefinite"/>
+                        <p:cond evt="onBegin" delay="0">
+                          <p:tn val="2"/>
+                        </p:cond>
+                      </p:stCondLst>
+                      <p:childTnLst>
+                        <p:par>
+                          <p:cTn id="4" fill="hold">
+                            <p:stCondLst>
+                              <p:cond delay="0"/>
+                            </p:stCondLst>
+                            <p:childTnLst>
+                              <p:par>
+                                <p:cTn id="5" presetID="44" presetClass="path" presetSubtype="0" accel="22000" decel="21000" fill="hold" nodeType="afterEffect">
+                                  <p:stCondLst>
+                                    <p:cond delay="0"/>
+                                  </p:stCondLst>
+                                  <p:childTnLst>
+                                    <p:animMotion origin="layout" path="M 0 0 L 0.067 -0.04 C 0.081 -0.049 0.102 -0.054 0.124 -0.054 C 0.149 -0.054 0.169 -0.049 0.183 -0.04 L 0.25 0 E" pathEditMode="relative" ptsTypes="">
+                                      <p:cBhvr>
+                                        <p:cTn id="6" dur="1000" fill="hold"/>
+                                        <p:tgtEl>
+                                          <p:spTgt spid="8"/>
+                                        </p:tgtEl>
+                                        <p:attrNameLst>
+                                          <p:attrName>ppt_x</p:attrName>
+                                          <p:attrName>ppt_y</p:attrName>
+                                        </p:attrNameLst>
+                                      </p:cBhvr>
+                                    </p:animMotion>
+                                  </p:childTnLst>
+                                </p:cTn>
+                              </p:par>
+                              <p:par>
+                                <p:cTn id="7" presetID="44" presetClass="path" presetSubtype="0" accel="13000" decel="6000" fill="hold" nodeType="withEffect">
+                                  <p:stCondLst>
+                                    <p:cond delay="0"/>
+                                  </p:stCondLst>
+                                  <p:childTnLst>
+                                    <p:animMotion origin="layout" path="M 0.00416 -2.59259E-6 L 0.0763 -0.04606 C 0.09127 -0.05648 0.1138 -0.06203 0.1375 -0.06203 C 0.16432 -0.06203 0.18593 -0.05648 0.20091 -0.04606 L 0.27317 -2.59259E-6 " pathEditMode="relative" rAng="0" ptsTypes="AAAAA">
+                                      <p:cBhvr>
+                                        <p:cTn id="8" dur="1000" fill="hold"/>
+                                        <p:tgtEl>
+                                          <p:spTgt spid="6"/>
+                                        </p:tgtEl>
+                                        <p:attrNameLst>
+                                          <p:attrName>ppt_x</p:attrName>
+                                          <p:attrName>ppt_y</p:attrName>
+                                        </p:attrNameLst>
+                                      </p:cBhvr>
+                                      <p:rCtr x="13451" y="-3102"/>
+                                    </p:animMotion>
+                                  </p:childTnLst>
+                                </p:cTn>
+                              </p:par>
+                            </p:childTnLst>
+                          </p:cTn>
+                        </p:par>
+                        <p:par>
+                          <p:cTn id="9" fill="hold">
+                            <p:stCondLst>
+                              <p:cond delay="1000"/>
+                            </p:stCondLst>
+                            <p:childTnLst>
+                              <p:par>
+                                <p:cTn id="10" presetID="8" presetClass="emph" presetSubtype="0" fill="hold" grpId="0" nodeType="afterEffect">
+                                  <p:stCondLst>
+                                    <p:cond delay="0"/>
+                                  </p:stCondLst>
+                                  <p:childTnLst>
+                                    <p:animRot by="600000">
+                                      <p:cBhvr>
+                                        <p:cTn id="11" dur="1000" fill="hold"/>
+                                        <p:tgtEl>
+                                          <p:spTgt spid="5"/>
+                                        </p:tgtEl>
+                                        <p:attrNameLst>
+                                          <p:attrName>r</p:attrName>
+                                        </p:attrNameLst>
+                                      </p:cBhvr>
+                                    </p:animRot>
+                                  </p:childTnLst>
+                                </p:cTn>
+                              </p:par>
+                              <p:par>
+                                <p:cTn id="12" presetID="42" presetClass="path" presetSubtype="0" fill="hold" nodeType="withEffect">
+                                  <p:stCondLst>
+                                    <p:cond delay="0"/>
+                                  </p:stCondLst>
+                                  <p:childTnLst>
+                                    <p:animMotion origin="layout" path="M 0.27318 -7.40741E-7 L 0.27292 0.08241 " pathEditMode="relative" rAng="0" ptsTypes="AA">
+                                      <p:cBhvr>
+                                        <p:cTn id="13" dur="1000" fill="hold"/>
+                                        <p:tgtEl>
+                                          <p:spTgt spid="6"/>
+                                        </p:tgtEl>
+                                        <p:attrNameLst>
+                                          <p:attrName>ppt_x</p:attrName>
+                                          <p:attrName>ppt_y</p:attrName>
+                                        </p:attrNameLst>
+                                      </p:cBhvr>
+                                      <p:rCtr x="-13" y="4120"/>
+                                    </p:animMotion>
+                                  </p:childTnLst>
+                                </p:cTn>
+                              </p:par>
+                            </p:childTnLst>
+                          </p:cTn>
+                        </p:par>
+                      </p:childTnLst>
+                    </p:cTn>
+                  </p:par>
+                </p:childTnLst>
+              </p:cTn>
+              <p:prevCondLst>
+                <p:cond evt="onPrev" delay="0">
+                  <p:tgtEl>
+                    <p:sldTgt/>
+                  </p:tgtEl>
+                </p:cond>
+              </p:prevCondLst>
+              <p:nextCondLst>
+                <p:cond evt="onNext" delay="0">
+                  <p:tgtEl>
+                    <p:sldTgt/>
+                  </p:tgtEl>
+                </p:cond>
+              </p:nextCondLst>
+            </p:seq>
+          </p:childTnLst>
+        </p:cTn>
+      </p:par>
+    </p:tnLst>
+    <p:bldLst>
+      <p:bldP spid="5" grpId="0" animBg="1"/>
+    </p:bldLst>
+  </p:timing>
+</p:sld>
+</file>
+
+<file path=ppt/slides/slide6.xml><?xml version="1.0" encoding="utf-8"?>
+<p:sld xmlns:a="http://schemas.openxmlformats.org/drawingml/2006/main" xmlns:r="http://schemas.openxmlformats.org/officeDocument/2006/relationships" xmlns:p="http://schemas.openxmlformats.org/presentationml/2006/main">
+  <p:cSld>
+    <p:bg>
+      <p:bgPr>
+        <a:solidFill>
           <a:srgbClr val="C24E4E"/>
         </a:solidFill>
         <a:effectLst/>
@@ -4238,8 +4667,8 @@
         </p:nvSpPr>
         <p:spPr>
           <a:xfrm>
-            <a:off x="861085" y="5247663"/>
-            <a:ext cx="1597685" cy="584775"/>
+            <a:off x="677368" y="5238855"/>
+            <a:ext cx="2051035" cy="584775"/>
           </a:xfrm>
           <a:prstGeom prst="rect">
             <a:avLst/>
@@ -4261,21 +4690,7 @@
                 </a:solidFill>
                 <a:latin typeface="Bahnschrift Light Condensed" panose="020B0502040204020203" pitchFamily="34" charset="0"/>
               </a:rPr>
-              <a:t>Nombre d’objets </a:t>
-            </a:r>
-          </a:p>
-          <a:p>
-            <a:pPr algn="ctr">
-              <a:buSzPct val="150000"/>
-            </a:pPr>
-            <a:r>
-              <a:rPr lang="fr-FR" sz="1600" dirty="0">
-                <a:solidFill>
-                  <a:schemeClr val="bg1"/>
-                </a:solidFill>
-                <a:latin typeface="Bahnschrift Light Condensed" panose="020B0502040204020203" pitchFamily="34" charset="0"/>
-              </a:rPr>
-              <a:t>restants de la vague</a:t>
+              <a:t>Nombre d’objets restants de la vague en cours</a:t>
             </a:r>
           </a:p>
         </p:txBody>
@@ -4552,7 +4967,285 @@
 </p:sld>
 </file>
 
-<file path=ppt/slides/slide6.xml><?xml version="1.0" encoding="utf-8"?>
+<file path=ppt/slides/slide7.xml><?xml version="1.0" encoding="utf-8"?>
+<p:sld xmlns:a="http://schemas.openxmlformats.org/drawingml/2006/main" xmlns:r="http://schemas.openxmlformats.org/officeDocument/2006/relationships" xmlns:p="http://schemas.openxmlformats.org/presentationml/2006/main">
+  <p:cSld>
+    <p:bg>
+      <p:bgPr>
+        <a:solidFill>
+          <a:srgbClr val="BE8FD5"/>
+        </a:solidFill>
+        <a:effectLst/>
+      </p:bgPr>
+    </p:bg>
+    <p:spTree>
+      <p:nvGrpSpPr>
+        <p:cNvPr id="1" name=""/>
+        <p:cNvGrpSpPr/>
+        <p:nvPr/>
+      </p:nvGrpSpPr>
+      <p:grpSpPr>
+        <a:xfrm>
+          <a:off x="0" y="0"/>
+          <a:ext cx="0" cy="0"/>
+          <a:chOff x="0" y="0"/>
+          <a:chExt cx="0" cy="0"/>
+        </a:xfrm>
+      </p:grpSpPr>
+      <p:sp>
+        <p:nvSpPr>
+          <p:cNvPr id="6" name="Titre 1">
+            <a:extLst>
+              <a:ext uri="{FF2B5EF4-FFF2-40B4-BE49-F238E27FC236}">
+                <a16:creationId xmlns:a16="http://schemas.microsoft.com/office/drawing/2014/main" id="{2E4936FA-BAEE-438B-8095-88A9E0FF1591}"/>
+              </a:ext>
+            </a:extLst>
+          </p:cNvPr>
+          <p:cNvSpPr>
+            <a:spLocks noGrp="1"/>
+          </p:cNvSpPr>
+          <p:nvPr>
+            <p:ph type="title"/>
+          </p:nvPr>
+        </p:nvSpPr>
+        <p:spPr>
+          <a:xfrm>
+            <a:off x="391006" y="1904"/>
+            <a:ext cx="5127031" cy="1676603"/>
+          </a:xfrm>
+        </p:spPr>
+        <p:txBody>
+          <a:bodyPr>
+            <a:normAutofit/>
+          </a:bodyPr>
+          <a:lstStyle/>
+          <a:p>
+            <a:r>
+              <a:rPr lang="fr-FR" dirty="0">
+                <a:solidFill>
+                  <a:schemeClr val="bg1">
+                    <a:lumMod val="95000"/>
+                  </a:schemeClr>
+                </a:solidFill>
+                <a:latin typeface="Bahnschrift SemiBold SemiConden" panose="020B0502040204020203" pitchFamily="34" charset="0"/>
+              </a:rPr>
+              <a:t>Support</a:t>
+            </a:r>
+          </a:p>
+        </p:txBody>
+      </p:sp>
+      <p:pic>
+        <p:nvPicPr>
+          <p:cNvPr id="16" name="Image 15">
+            <a:extLst>
+              <a:ext uri="{FF2B5EF4-FFF2-40B4-BE49-F238E27FC236}">
+                <a16:creationId xmlns:a16="http://schemas.microsoft.com/office/drawing/2014/main" id="{7C5C0DDD-664C-42D0-9946-EB00A6088BD9}"/>
+              </a:ext>
+            </a:extLst>
+          </p:cNvPr>
+          <p:cNvPicPr>
+            <a:picLocks noChangeAspect="1"/>
+          </p:cNvPicPr>
+          <p:nvPr/>
+        </p:nvPicPr>
+        <p:blipFill>
+          <a:blip r:embed="rId2">
+            <a:extLst>
+              <a:ext uri="{28A0092B-C50C-407E-A947-70E740481C1C}">
+                <a14:useLocalDpi xmlns:a14="http://schemas.microsoft.com/office/drawing/2010/main" val="0"/>
+              </a:ext>
+            </a:extLst>
+          </a:blip>
+          <a:stretch>
+            <a:fillRect/>
+          </a:stretch>
+        </p:blipFill>
+        <p:spPr>
+          <a:xfrm>
+            <a:off x="4124813" y="1986856"/>
+            <a:ext cx="4204281" cy="4140772"/>
+          </a:xfrm>
+          <a:prstGeom prst="rect">
+            <a:avLst/>
+          </a:prstGeom>
+        </p:spPr>
+      </p:pic>
+      <p:pic>
+        <p:nvPicPr>
+          <p:cNvPr id="21" name="Image 20">
+            <a:extLst>
+              <a:ext uri="{FF2B5EF4-FFF2-40B4-BE49-F238E27FC236}">
+                <a16:creationId xmlns:a16="http://schemas.microsoft.com/office/drawing/2014/main" id="{D0490CE9-F769-4B4E-B031-676917C5F18B}"/>
+              </a:ext>
+            </a:extLst>
+          </p:cNvPr>
+          <p:cNvPicPr>
+            <a:picLocks noChangeAspect="1"/>
+          </p:cNvPicPr>
+          <p:nvPr/>
+        </p:nvPicPr>
+        <p:blipFill>
+          <a:blip r:embed="rId3"/>
+          <a:stretch>
+            <a:fillRect/>
+          </a:stretch>
+        </p:blipFill>
+        <p:spPr>
+          <a:xfrm>
+            <a:off x="4401038" y="2420313"/>
+            <a:ext cx="3567167" cy="2174113"/>
+          </a:xfrm>
+          <a:prstGeom prst="rect">
+            <a:avLst/>
+          </a:prstGeom>
+        </p:spPr>
+      </p:pic>
+      <p:pic>
+        <p:nvPicPr>
+          <p:cNvPr id="20" name="Image 19">
+            <a:extLst>
+              <a:ext uri="{FF2B5EF4-FFF2-40B4-BE49-F238E27FC236}">
+                <a16:creationId xmlns:a16="http://schemas.microsoft.com/office/drawing/2014/main" id="{1A8A8655-85A9-40EE-8A47-C7C022CCF32E}"/>
+              </a:ext>
+            </a:extLst>
+          </p:cNvPr>
+          <p:cNvPicPr>
+            <a:picLocks noChangeAspect="1"/>
+          </p:cNvPicPr>
+          <p:nvPr/>
+        </p:nvPicPr>
+        <p:blipFill>
+          <a:blip r:embed="rId4">
+            <a:extLst>
+              <a:ext uri="{28A0092B-C50C-407E-A947-70E740481C1C}">
+                <a14:useLocalDpi xmlns:a14="http://schemas.microsoft.com/office/drawing/2010/main" val="0"/>
+              </a:ext>
+            </a:extLst>
+          </a:blip>
+          <a:stretch>
+            <a:fillRect/>
+          </a:stretch>
+        </p:blipFill>
+        <p:spPr>
+          <a:xfrm>
+            <a:off x="2151896" y="3779752"/>
+            <a:ext cx="2758183" cy="2758183"/>
+          </a:xfrm>
+          <a:prstGeom prst="rect">
+            <a:avLst/>
+          </a:prstGeom>
+        </p:spPr>
+      </p:pic>
+      <p:pic>
+        <p:nvPicPr>
+          <p:cNvPr id="22" name="Image 21">
+            <a:extLst>
+              <a:ext uri="{FF2B5EF4-FFF2-40B4-BE49-F238E27FC236}">
+                <a16:creationId xmlns:a16="http://schemas.microsoft.com/office/drawing/2014/main" id="{68D2A7C9-CA90-4860-AFAB-FD815B1A1C27}"/>
+              </a:ext>
+            </a:extLst>
+          </p:cNvPr>
+          <p:cNvPicPr>
+            <a:picLocks noChangeAspect="1"/>
+          </p:cNvPicPr>
+          <p:nvPr/>
+        </p:nvPicPr>
+        <p:blipFill>
+          <a:blip r:embed="rId3"/>
+          <a:stretch>
+            <a:fillRect/>
+          </a:stretch>
+        </p:blipFill>
+        <p:spPr>
+          <a:xfrm>
+            <a:off x="2413409" y="4451960"/>
+            <a:ext cx="2085975" cy="1422902"/>
+          </a:xfrm>
+          <a:prstGeom prst="rect">
+            <a:avLst/>
+          </a:prstGeom>
+        </p:spPr>
+      </p:pic>
+      <p:pic>
+        <p:nvPicPr>
+          <p:cNvPr id="18" name="Image 17">
+            <a:extLst>
+              <a:ext uri="{FF2B5EF4-FFF2-40B4-BE49-F238E27FC236}">
+                <a16:creationId xmlns:a16="http://schemas.microsoft.com/office/drawing/2014/main" id="{F26D7A7B-087D-4A4C-B298-67A5EE1327B7}"/>
+              </a:ext>
+            </a:extLst>
+          </p:cNvPr>
+          <p:cNvPicPr>
+            <a:picLocks noChangeAspect="1"/>
+          </p:cNvPicPr>
+          <p:nvPr/>
+        </p:nvPicPr>
+        <p:blipFill>
+          <a:blip r:embed="rId5">
+            <a:extLst>
+              <a:ext uri="{28A0092B-C50C-407E-A947-70E740481C1C}">
+                <a14:useLocalDpi xmlns:a14="http://schemas.microsoft.com/office/drawing/2010/main" val="0"/>
+              </a:ext>
+            </a:extLst>
+          </a:blip>
+          <a:stretch>
+            <a:fillRect/>
+          </a:stretch>
+        </p:blipFill>
+        <p:spPr>
+          <a:xfrm rot="5400000">
+            <a:off x="7088101" y="5233423"/>
+            <a:ext cx="1107204" cy="1107204"/>
+          </a:xfrm>
+          <a:prstGeom prst="rect">
+            <a:avLst/>
+          </a:prstGeom>
+        </p:spPr>
+      </p:pic>
+      <p:pic>
+        <p:nvPicPr>
+          <p:cNvPr id="23" name="Image 22">
+            <a:extLst>
+              <a:ext uri="{FF2B5EF4-FFF2-40B4-BE49-F238E27FC236}">
+                <a16:creationId xmlns:a16="http://schemas.microsoft.com/office/drawing/2014/main" id="{A97E7968-2095-45A3-BE65-73D9D3B30D37}"/>
+              </a:ext>
+            </a:extLst>
+          </p:cNvPr>
+          <p:cNvPicPr>
+            <a:picLocks noChangeAspect="1"/>
+          </p:cNvPicPr>
+          <p:nvPr/>
+        </p:nvPicPr>
+        <p:blipFill>
+          <a:blip r:embed="rId3"/>
+          <a:stretch>
+            <a:fillRect/>
+          </a:stretch>
+        </p:blipFill>
+        <p:spPr>
+          <a:xfrm>
+            <a:off x="7226413" y="5514771"/>
+            <a:ext cx="849629" cy="540697"/>
+          </a:xfrm>
+          <a:prstGeom prst="rect">
+            <a:avLst/>
+          </a:prstGeom>
+        </p:spPr>
+      </p:pic>
+    </p:spTree>
+    <p:extLst>
+      <p:ext uri="{BB962C8B-B14F-4D97-AF65-F5344CB8AC3E}">
+        <p14:creationId xmlns:p14="http://schemas.microsoft.com/office/powerpoint/2010/main" val="1145153348"/>
+      </p:ext>
+    </p:extLst>
+  </p:cSld>
+  <p:clrMapOvr>
+    <a:masterClrMapping/>
+  </p:clrMapOvr>
+</p:sld>
+</file>
+
+<file path=ppt/slides/slide8.xml><?xml version="1.0" encoding="utf-8"?>
 <p:sld xmlns:a="http://schemas.openxmlformats.org/drawingml/2006/main" xmlns:r="http://schemas.openxmlformats.org/officeDocument/2006/relationships" xmlns:p="http://schemas.openxmlformats.org/presentationml/2006/main">
   <p:cSld>
     <p:bg>
@@ -4604,7 +5297,7 @@
         </p:blipFill>
         <p:spPr>
           <a:xfrm>
-            <a:off x="209550" y="602456"/>
+            <a:off x="255848" y="590882"/>
             <a:ext cx="11391900" cy="6407944"/>
           </a:xfrm>
           <a:prstGeom prst="rect">
@@ -4668,7 +5361,7 @@
 </p:sld>
 </file>
 
-<file path=ppt/slides/slide7.xml><?xml version="1.0" encoding="utf-8"?>
+<file path=ppt/slides/slide9.xml><?xml version="1.0" encoding="utf-8"?>
 <p:sld xmlns:a="http://schemas.openxmlformats.org/drawingml/2006/main" xmlns:r="http://schemas.openxmlformats.org/officeDocument/2006/relationships" xmlns:p="http://schemas.openxmlformats.org/presentationml/2006/main">
   <p:cSld>
     <p:bg>
@@ -4707,7 +5400,7 @@
         </p:nvSpPr>
         <p:spPr>
           <a:xfrm rot="21174264">
-            <a:off x="1473170" y="2164568"/>
+            <a:off x="1473170" y="2234018"/>
             <a:ext cx="8842485" cy="1323439"/>
           </a:xfrm>
           <a:prstGeom prst="rect">
@@ -4749,7 +5442,7 @@
         </p:nvSpPr>
         <p:spPr>
           <a:xfrm>
-            <a:off x="5803844" y="4029075"/>
+            <a:off x="5803844" y="4086948"/>
             <a:ext cx="514350" cy="2828924"/>
           </a:xfrm>
           <a:prstGeom prst="rect">
@@ -4859,234 +5552,150 @@
           </a:p>
         </p:txBody>
       </p:sp>
-      <p:sp>
-        <p:nvSpPr>
-          <p:cNvPr id="10" name="Rectangle 9">
+      <p:pic>
+        <p:nvPicPr>
+          <p:cNvPr id="3" name="Image 2">
             <a:extLst>
               <a:ext uri="{FF2B5EF4-FFF2-40B4-BE49-F238E27FC236}">
-                <a16:creationId xmlns:a16="http://schemas.microsoft.com/office/drawing/2014/main" id="{AE8DCF14-102D-457B-8020-EFA0F1948DA9}"/>
+                <a16:creationId xmlns:a16="http://schemas.microsoft.com/office/drawing/2014/main" id="{CA8A25DA-9623-4751-B9A7-15C1ED076E26}"/>
               </a:ext>
             </a:extLst>
           </p:cNvPr>
-          <p:cNvSpPr/>
+          <p:cNvPicPr>
+            <a:picLocks noChangeAspect="1"/>
+          </p:cNvPicPr>
           <p:nvPr/>
-        </p:nvSpPr>
-        <p:spPr>
-          <a:xfrm rot="21153248">
-            <a:off x="1660841" y="3680528"/>
-            <a:ext cx="514350" cy="514350"/>
+        </p:nvPicPr>
+        <p:blipFill>
+          <a:blip r:embed="rId2">
+            <a:extLst>
+              <a:ext uri="{28A0092B-C50C-407E-A947-70E740481C1C}">
+                <a14:useLocalDpi xmlns:a14="http://schemas.microsoft.com/office/drawing/2010/main" val="0"/>
+              </a:ext>
+            </a:extLst>
+          </a:blip>
+          <a:stretch>
+            <a:fillRect/>
+          </a:stretch>
+        </p:blipFill>
+        <p:spPr>
+          <a:xfrm rot="21103004">
+            <a:off x="1740160" y="3758330"/>
+            <a:ext cx="466737" cy="425737"/>
           </a:xfrm>
           <a:prstGeom prst="rect">
             <a:avLst/>
           </a:prstGeom>
-          <a:solidFill>
-            <a:schemeClr val="bg1"/>
-          </a:solidFill>
-          <a:ln>
-            <a:solidFill>
-              <a:schemeClr val="bg1"/>
-            </a:solidFill>
-          </a:ln>
-          <a:effectLst>
-            <a:reflection stA="0" endPos="0" dist="50800" dir="5400000" sy="-100000" algn="bl" rotWithShape="0"/>
-          </a:effectLst>
-        </p:spPr>
-        <p:style>
-          <a:lnRef idx="2">
-            <a:schemeClr val="accent1">
-              <a:shade val="50000"/>
-            </a:schemeClr>
-          </a:lnRef>
-          <a:fillRef idx="1">
-            <a:schemeClr val="accent1"/>
-          </a:fillRef>
-          <a:effectRef idx="0">
-            <a:schemeClr val="accent1"/>
-          </a:effectRef>
-          <a:fontRef idx="minor">
-            <a:schemeClr val="lt1"/>
-          </a:fontRef>
-        </p:style>
-        <p:txBody>
-          <a:bodyPr rtlCol="0" anchor="ctr"/>
-          <a:lstStyle/>
-          <a:p>
-            <a:pPr algn="ctr"/>
-            <a:endParaRPr lang="fr-FR"/>
-          </a:p>
-        </p:txBody>
-      </p:sp>
-      <p:sp>
-        <p:nvSpPr>
-          <p:cNvPr id="11" name="Rectangle 10">
+        </p:spPr>
+      </p:pic>
+      <p:pic>
+        <p:nvPicPr>
+          <p:cNvPr id="15" name="Image 14">
             <a:extLst>
               <a:ext uri="{FF2B5EF4-FFF2-40B4-BE49-F238E27FC236}">
-                <a16:creationId xmlns:a16="http://schemas.microsoft.com/office/drawing/2014/main" id="{E6B34BDF-FF7A-494B-B7E3-D2288C7F0058}"/>
+                <a16:creationId xmlns:a16="http://schemas.microsoft.com/office/drawing/2014/main" id="{12373E96-BBE0-4B22-A619-BE13CE717478}"/>
               </a:ext>
             </a:extLst>
           </p:cNvPr>
-          <p:cNvSpPr/>
+          <p:cNvPicPr>
+            <a:picLocks noChangeAspect="1"/>
+          </p:cNvPicPr>
           <p:nvPr/>
-        </p:nvSpPr>
-        <p:spPr>
-          <a:xfrm rot="21153248">
-            <a:off x="9818025" y="2654804"/>
-            <a:ext cx="514350" cy="514350"/>
+        </p:nvPicPr>
+        <p:blipFill>
+          <a:blip r:embed="rId2">
+            <a:extLst>
+              <a:ext uri="{28A0092B-C50C-407E-A947-70E740481C1C}">
+                <a14:useLocalDpi xmlns:a14="http://schemas.microsoft.com/office/drawing/2010/main" val="0"/>
+              </a:ext>
+            </a:extLst>
+          </a:blip>
+          <a:stretch>
+            <a:fillRect/>
+          </a:stretch>
+        </p:blipFill>
+        <p:spPr>
+          <a:xfrm rot="21103004">
+            <a:off x="9642210" y="2770585"/>
+            <a:ext cx="466737" cy="425737"/>
           </a:xfrm>
           <a:prstGeom prst="rect">
             <a:avLst/>
           </a:prstGeom>
-          <a:solidFill>
-            <a:schemeClr val="bg1"/>
-          </a:solidFill>
-          <a:ln>
-            <a:solidFill>
-              <a:schemeClr val="bg1"/>
-            </a:solidFill>
-          </a:ln>
-          <a:effectLst>
-            <a:reflection stA="0" endPos="0" dist="50800" dir="5400000" sy="-100000" algn="bl" rotWithShape="0"/>
-          </a:effectLst>
-        </p:spPr>
-        <p:style>
-          <a:lnRef idx="2">
-            <a:schemeClr val="accent1">
-              <a:shade val="50000"/>
-            </a:schemeClr>
-          </a:lnRef>
-          <a:fillRef idx="1">
-            <a:schemeClr val="accent1"/>
-          </a:fillRef>
-          <a:effectRef idx="0">
-            <a:schemeClr val="accent1"/>
-          </a:effectRef>
-          <a:fontRef idx="minor">
-            <a:schemeClr val="lt1"/>
-          </a:fontRef>
-        </p:style>
-        <p:txBody>
-          <a:bodyPr rtlCol="0" anchor="ctr"/>
-          <a:lstStyle/>
-          <a:p>
-            <a:pPr algn="ctr"/>
-            <a:endParaRPr lang="fr-FR"/>
-          </a:p>
-        </p:txBody>
-      </p:sp>
-      <p:sp>
-        <p:nvSpPr>
-          <p:cNvPr id="12" name="Rectangle 11">
+        </p:spPr>
+      </p:pic>
+      <p:pic>
+        <p:nvPicPr>
+          <p:cNvPr id="16" name="Image 15">
             <a:extLst>
               <a:ext uri="{FF2B5EF4-FFF2-40B4-BE49-F238E27FC236}">
-                <a16:creationId xmlns:a16="http://schemas.microsoft.com/office/drawing/2014/main" id="{68246C0C-CAF2-4ED4-9EA8-E4C940BB13F4}"/>
+                <a16:creationId xmlns:a16="http://schemas.microsoft.com/office/drawing/2014/main" id="{551F38F2-4A64-4FEB-B680-1A6CC4F5F5A8}"/>
               </a:ext>
             </a:extLst>
           </p:cNvPr>
-          <p:cNvSpPr/>
+          <p:cNvPicPr>
+            <a:picLocks noChangeAspect="1"/>
+          </p:cNvPicPr>
           <p:nvPr/>
-        </p:nvSpPr>
-        <p:spPr>
-          <a:xfrm>
-            <a:off x="5098460" y="444221"/>
-            <a:ext cx="514350" cy="514350"/>
+        </p:nvPicPr>
+        <p:blipFill>
+          <a:blip r:embed="rId2">
+            <a:extLst>
+              <a:ext uri="{28A0092B-C50C-407E-A947-70E740481C1C}">
+                <a14:useLocalDpi xmlns:a14="http://schemas.microsoft.com/office/drawing/2010/main" val="0"/>
+              </a:ext>
+            </a:extLst>
+          </a:blip>
+          <a:stretch>
+            <a:fillRect/>
+          </a:stretch>
+        </p:blipFill>
+        <p:spPr>
+          <a:xfrm>
+            <a:off x="7097711" y="596034"/>
+            <a:ext cx="466737" cy="425737"/>
           </a:xfrm>
           <a:prstGeom prst="rect">
             <a:avLst/>
           </a:prstGeom>
-          <a:solidFill>
-            <a:schemeClr val="bg1"/>
-          </a:solidFill>
-          <a:ln>
-            <a:solidFill>
-              <a:schemeClr val="bg1"/>
-            </a:solidFill>
-          </a:ln>
-          <a:effectLst>
-            <a:reflection stA="0" endPos="0" dist="50800" dir="5400000" sy="-100000" algn="bl" rotWithShape="0"/>
-          </a:effectLst>
-        </p:spPr>
-        <p:style>
-          <a:lnRef idx="2">
-            <a:schemeClr val="accent1">
-              <a:shade val="50000"/>
-            </a:schemeClr>
-          </a:lnRef>
-          <a:fillRef idx="1">
-            <a:schemeClr val="accent1"/>
-          </a:fillRef>
-          <a:effectRef idx="0">
-            <a:schemeClr val="accent1"/>
-          </a:effectRef>
-          <a:fontRef idx="minor">
-            <a:schemeClr val="lt1"/>
-          </a:fontRef>
-        </p:style>
-        <p:txBody>
-          <a:bodyPr rtlCol="0" anchor="ctr"/>
-          <a:lstStyle/>
-          <a:p>
-            <a:pPr algn="ctr"/>
-            <a:endParaRPr lang="fr-FR"/>
-          </a:p>
-        </p:txBody>
-      </p:sp>
-      <p:sp>
-        <p:nvSpPr>
-          <p:cNvPr id="13" name="Rectangle 12">
+        </p:spPr>
+      </p:pic>
+      <p:pic>
+        <p:nvPicPr>
+          <p:cNvPr id="17" name="Image 16">
             <a:extLst>
               <a:ext uri="{FF2B5EF4-FFF2-40B4-BE49-F238E27FC236}">
-                <a16:creationId xmlns:a16="http://schemas.microsoft.com/office/drawing/2014/main" id="{A167FAA9-A858-4D5E-B42D-B71D509A5386}"/>
+                <a16:creationId xmlns:a16="http://schemas.microsoft.com/office/drawing/2014/main" id="{6F936C65-CFB2-44B4-BBD3-C1B7015ABB47}"/>
               </a:ext>
             </a:extLst>
           </p:cNvPr>
-          <p:cNvSpPr/>
+          <p:cNvPicPr>
+            <a:picLocks noChangeAspect="1"/>
+          </p:cNvPicPr>
           <p:nvPr/>
-        </p:nvSpPr>
-        <p:spPr>
-          <a:xfrm>
-            <a:off x="10718210" y="5443537"/>
-            <a:ext cx="514350" cy="514350"/>
+        </p:nvPicPr>
+        <p:blipFill>
+          <a:blip r:embed="rId2">
+            <a:extLst>
+              <a:ext uri="{28A0092B-C50C-407E-A947-70E740481C1C}">
+                <a14:useLocalDpi xmlns:a14="http://schemas.microsoft.com/office/drawing/2010/main" val="0"/>
+              </a:ext>
+            </a:extLst>
+          </a:blip>
+          <a:stretch>
+            <a:fillRect/>
+          </a:stretch>
+        </p:blipFill>
+        <p:spPr>
+          <a:xfrm rot="18801837">
+            <a:off x="894735" y="5724918"/>
+            <a:ext cx="466737" cy="425737"/>
           </a:xfrm>
           <a:prstGeom prst="rect">
             <a:avLst/>
           </a:prstGeom>
-          <a:solidFill>
-            <a:schemeClr val="bg1"/>
-          </a:solidFill>
-          <a:ln>
-            <a:solidFill>
-              <a:schemeClr val="bg1"/>
-            </a:solidFill>
-          </a:ln>
-          <a:effectLst>
-            <a:reflection stA="0" endPos="0" dist="50800" dir="5400000" sy="-100000" algn="bl" rotWithShape="0"/>
-          </a:effectLst>
-        </p:spPr>
-        <p:style>
-          <a:lnRef idx="2">
-            <a:schemeClr val="accent1">
-              <a:shade val="50000"/>
-            </a:schemeClr>
-          </a:lnRef>
-          <a:fillRef idx="1">
-            <a:schemeClr val="accent1"/>
-          </a:fillRef>
-          <a:effectRef idx="0">
-            <a:schemeClr val="accent1"/>
-          </a:effectRef>
-          <a:fontRef idx="minor">
-            <a:schemeClr val="lt1"/>
-          </a:fontRef>
-        </p:style>
-        <p:txBody>
-          <a:bodyPr rtlCol="0" anchor="ctr"/>
-          <a:lstStyle/>
-          <a:p>
-            <a:pPr algn="ctr"/>
-            <a:endParaRPr lang="fr-FR"/>
-          </a:p>
-        </p:txBody>
-      </p:sp>
+        </p:spPr>
+      </p:pic>
     </p:spTree>
     <p:extLst>
       <p:ext uri="{BB962C8B-B14F-4D97-AF65-F5344CB8AC3E}">

</xml_diff>